<commit_message>
added web apps to the picture
</commit_message>
<xml_diff>
--- a/payments/saturn-openbanking.pptx
+++ b/payments/saturn-openbanking.pptx
@@ -288,7 +288,7 @@
           <a:p>
             <a:fld id="{FE398CD6-77FF-42E1-B299-E17665EBA674}" type="datetimeFigureOut">
               <a:rPr lang="en-US" smtClean="0"/>
-              <a:t>2020-06-04</a:t>
+              <a:t>2020-06-07</a:t>
             </a:fld>
             <a:endParaRPr lang="en-US"/>
           </a:p>
@@ -458,7 +458,7 @@
           <a:p>
             <a:fld id="{FE398CD6-77FF-42E1-B299-E17665EBA674}" type="datetimeFigureOut">
               <a:rPr lang="en-US" smtClean="0"/>
-              <a:t>2020-06-04</a:t>
+              <a:t>2020-06-07</a:t>
             </a:fld>
             <a:endParaRPr lang="en-US"/>
           </a:p>
@@ -638,7 +638,7 @@
           <a:p>
             <a:fld id="{FE398CD6-77FF-42E1-B299-E17665EBA674}" type="datetimeFigureOut">
               <a:rPr lang="en-US" smtClean="0"/>
-              <a:t>2020-06-04</a:t>
+              <a:t>2020-06-07</a:t>
             </a:fld>
             <a:endParaRPr lang="en-US"/>
           </a:p>
@@ -808,7 +808,7 @@
           <a:p>
             <a:fld id="{FE398CD6-77FF-42E1-B299-E17665EBA674}" type="datetimeFigureOut">
               <a:rPr lang="en-US" smtClean="0"/>
-              <a:t>2020-06-04</a:t>
+              <a:t>2020-06-07</a:t>
             </a:fld>
             <a:endParaRPr lang="en-US"/>
           </a:p>
@@ -1054,7 +1054,7 @@
           <a:p>
             <a:fld id="{FE398CD6-77FF-42E1-B299-E17665EBA674}" type="datetimeFigureOut">
               <a:rPr lang="en-US" smtClean="0"/>
-              <a:t>2020-06-04</a:t>
+              <a:t>2020-06-07</a:t>
             </a:fld>
             <a:endParaRPr lang="en-US"/>
           </a:p>
@@ -1342,7 +1342,7 @@
           <a:p>
             <a:fld id="{FE398CD6-77FF-42E1-B299-E17665EBA674}" type="datetimeFigureOut">
               <a:rPr lang="en-US" smtClean="0"/>
-              <a:t>2020-06-04</a:t>
+              <a:t>2020-06-07</a:t>
             </a:fld>
             <a:endParaRPr lang="en-US"/>
           </a:p>
@@ -1764,7 +1764,7 @@
           <a:p>
             <a:fld id="{FE398CD6-77FF-42E1-B299-E17665EBA674}" type="datetimeFigureOut">
               <a:rPr lang="en-US" smtClean="0"/>
-              <a:t>2020-06-04</a:t>
+              <a:t>2020-06-07</a:t>
             </a:fld>
             <a:endParaRPr lang="en-US"/>
           </a:p>
@@ -1882,7 +1882,7 @@
           <a:p>
             <a:fld id="{FE398CD6-77FF-42E1-B299-E17665EBA674}" type="datetimeFigureOut">
               <a:rPr lang="en-US" smtClean="0"/>
-              <a:t>2020-06-04</a:t>
+              <a:t>2020-06-07</a:t>
             </a:fld>
             <a:endParaRPr lang="en-US"/>
           </a:p>
@@ -1977,7 +1977,7 @@
           <a:p>
             <a:fld id="{FE398CD6-77FF-42E1-B299-E17665EBA674}" type="datetimeFigureOut">
               <a:rPr lang="en-US" smtClean="0"/>
-              <a:t>2020-06-04</a:t>
+              <a:t>2020-06-07</a:t>
             </a:fld>
             <a:endParaRPr lang="en-US"/>
           </a:p>
@@ -2254,7 +2254,7 @@
           <a:p>
             <a:fld id="{FE398CD6-77FF-42E1-B299-E17665EBA674}" type="datetimeFigureOut">
               <a:rPr lang="en-US" smtClean="0"/>
-              <a:t>2020-06-04</a:t>
+              <a:t>2020-06-07</a:t>
             </a:fld>
             <a:endParaRPr lang="en-US"/>
           </a:p>
@@ -2507,7 +2507,7 @@
           <a:p>
             <a:fld id="{FE398CD6-77FF-42E1-B299-E17665EBA674}" type="datetimeFigureOut">
               <a:rPr lang="en-US" smtClean="0"/>
-              <a:t>2020-06-04</a:t>
+              <a:t>2020-06-07</a:t>
             </a:fld>
             <a:endParaRPr lang="en-US"/>
           </a:p>
@@ -2720,7 +2720,7 @@
           <a:p>
             <a:fld id="{FE398CD6-77FF-42E1-B299-E17665EBA674}" type="datetimeFigureOut">
               <a:rPr lang="en-US" smtClean="0"/>
-              <a:t>2020-06-04</a:t>
+              <a:t>2020-06-07</a:t>
             </a:fld>
             <a:endParaRPr lang="en-US"/>
           </a:p>
@@ -4144,8 +4144,8 @@
         </p:nvSpPr>
         <p:spPr>
           <a:xfrm>
-            <a:off x="6300192" y="3651402"/>
-            <a:ext cx="2403222" cy="954107"/>
+            <a:off x="6300192" y="3289765"/>
+            <a:ext cx="2403222" cy="1677382"/>
           </a:xfrm>
           <a:prstGeom prst="rect">
             <a:avLst/>
@@ -4242,7 +4242,72 @@
                 <a:latin typeface="Arial" panose="020B0604020202020204" pitchFamily="34" charset="0"/>
                 <a:cs typeface="Arial" panose="020B0604020202020204" pitchFamily="34" charset="0"/>
               </a:rPr>
-              <a:t>optimized security model</a:t>
+              <a:t>optimized security </a:t>
+            </a:r>
+            <a:r>
+              <a:rPr lang="en-US" sz="1400" dirty="0" smtClean="0">
+                <a:solidFill>
+                  <a:schemeClr val="tx1"/>
+                </a:solidFill>
+                <a:latin typeface="Arial" panose="020B0604020202020204" pitchFamily="34" charset="0"/>
+                <a:cs typeface="Arial" panose="020B0604020202020204" pitchFamily="34" charset="0"/>
+              </a:rPr>
+              <a:t>model.</a:t>
+            </a:r>
+          </a:p>
+          <a:p>
+            <a:pPr>
+              <a:spcBef>
+                <a:spcPts val="600"/>
+              </a:spcBef>
+            </a:pPr>
+            <a:r>
+              <a:rPr lang="en-US" sz="1400" dirty="0" smtClean="0">
+                <a:solidFill>
+                  <a:schemeClr val="tx1"/>
+                </a:solidFill>
+                <a:latin typeface="Arial" panose="020B0604020202020204" pitchFamily="34" charset="0"/>
+                <a:cs typeface="Arial" panose="020B0604020202020204" pitchFamily="34" charset="0"/>
+              </a:rPr>
+              <a:t>Web Applications are used</a:t>
+            </a:r>
+            <a:br>
+              <a:rPr lang="en-US" sz="1400" dirty="0" smtClean="0">
+                <a:solidFill>
+                  <a:schemeClr val="tx1"/>
+                </a:solidFill>
+                <a:latin typeface="Arial" panose="020B0604020202020204" pitchFamily="34" charset="0"/>
+                <a:cs typeface="Arial" panose="020B0604020202020204" pitchFamily="34" charset="0"/>
+              </a:rPr>
+            </a:br>
+            <a:r>
+              <a:rPr lang="en-US" sz="1400" dirty="0" smtClean="0">
+                <a:solidFill>
+                  <a:schemeClr val="tx1"/>
+                </a:solidFill>
+                <a:latin typeface="Arial" panose="020B0604020202020204" pitchFamily="34" charset="0"/>
+                <a:cs typeface="Arial" panose="020B0604020202020204" pitchFamily="34" charset="0"/>
+              </a:rPr>
+              <a:t>for administration and user</a:t>
+            </a:r>
+            <a:br>
+              <a:rPr lang="en-US" sz="1400" dirty="0" smtClean="0">
+                <a:solidFill>
+                  <a:schemeClr val="tx1"/>
+                </a:solidFill>
+                <a:latin typeface="Arial" panose="020B0604020202020204" pitchFamily="34" charset="0"/>
+                <a:cs typeface="Arial" panose="020B0604020202020204" pitchFamily="34" charset="0"/>
+              </a:rPr>
+            </a:br>
+            <a:r>
+              <a:rPr lang="en-US" sz="1400" dirty="0" smtClean="0">
+                <a:solidFill>
+                  <a:schemeClr val="tx1"/>
+                </a:solidFill>
+                <a:latin typeface="Arial" panose="020B0604020202020204" pitchFamily="34" charset="0"/>
+                <a:cs typeface="Arial" panose="020B0604020202020204" pitchFamily="34" charset="0"/>
+              </a:rPr>
+              <a:t>enrollment purposes.</a:t>
             </a:r>
             <a:endParaRPr lang="en-US" sz="1400" dirty="0">
               <a:solidFill>

</xml_diff>